<commit_message>
Backup check-in for slide reordering feature.
</commit_message>
<xml_diff>
--- a/__tests__/fixtures/three-slides.pptx
+++ b/__tests__/fixtures/three-slides.pptx
@@ -194,7 +194,8 @@
           <a:p>
             <a:fld id="{900781C4-03C4-45B9-B6ED-EC20C5A1A7AA}" type="datetimeFigureOut">
               <a:rPr lang="en-US" smtClean="0"/>
-              <a:t>8/30/2018</a:t>
+              <a:pPr/>
+              <a:t>9/30/2018</a:t>
             </a:fld>
             <a:endParaRPr lang="en-US"/>
           </a:p>
@@ -355,6 +356,7 @@
           <a:p>
             <a:fld id="{FA25B090-634C-42C4-A011-FC814FE89D3F}" type="slidenum">
               <a:rPr lang="en-US" smtClean="0"/>
+              <a:pPr/>
               <a:t>‹#›</a:t>
             </a:fld>
             <a:endParaRPr lang="en-US"/>
@@ -526,6 +528,7 @@
           <a:p>
             <a:fld id="{FA25B090-634C-42C4-A011-FC814FE89D3F}" type="slidenum">
               <a:rPr lang="en-US" smtClean="0"/>
+              <a:pPr/>
               <a:t>1</a:t>
             </a:fld>
             <a:endParaRPr lang="en-US"/>
@@ -721,7 +724,8 @@
           <a:p>
             <a:fld id="{9A9289EB-B834-4DF0-BE89-7946C150DF36}" type="datetime1">
               <a:rPr lang="en-US" smtClean="0"/>
-              <a:t>8/30/2018</a:t>
+              <a:pPr/>
+              <a:t>9/30/2018</a:t>
             </a:fld>
             <a:endParaRPr lang="en-US"/>
           </a:p>
@@ -887,7 +891,8 @@
           <a:p>
             <a:fld id="{4DFA65DB-4075-49F3-A389-B1B23D5F4954}" type="datetime1">
               <a:rPr lang="en-US" smtClean="0"/>
-              <a:t>8/30/2018</a:t>
+              <a:pPr/>
+              <a:t>9/30/2018</a:t>
             </a:fld>
             <a:endParaRPr lang="en-US"/>
           </a:p>
@@ -1063,7 +1068,8 @@
           <a:p>
             <a:fld id="{70E50292-014F-4820-BA7E-9D358CED68D3}" type="datetime1">
               <a:rPr lang="en-US" smtClean="0"/>
-              <a:t>8/30/2018</a:t>
+              <a:pPr/>
+              <a:t>9/30/2018</a:t>
             </a:fld>
             <a:endParaRPr lang="en-US"/>
           </a:p>
@@ -1229,7 +1235,8 @@
           <a:p>
             <a:fld id="{71191D2F-44DD-49AC-9A7C-B8E87CD254ED}" type="datetime1">
               <a:rPr lang="en-US" smtClean="0"/>
-              <a:t>8/30/2018</a:t>
+              <a:pPr/>
+              <a:t>9/30/2018</a:t>
             </a:fld>
             <a:endParaRPr lang="en-US"/>
           </a:p>
@@ -1471,7 +1478,8 @@
           <a:p>
             <a:fld id="{64729DE4-ED43-41F1-A2D3-7AB76CE71259}" type="datetime1">
               <a:rPr lang="en-US" smtClean="0"/>
-              <a:t>8/30/2018</a:t>
+              <a:pPr/>
+              <a:t>9/30/2018</a:t>
             </a:fld>
             <a:endParaRPr lang="en-US"/>
           </a:p>
@@ -1755,7 +1763,8 @@
           <a:p>
             <a:fld id="{9C178DF1-F101-4559-8C23-F0A559CA3E38}" type="datetime1">
               <a:rPr lang="en-US" smtClean="0"/>
-              <a:t>8/30/2018</a:t>
+              <a:pPr/>
+              <a:t>9/30/2018</a:t>
             </a:fld>
             <a:endParaRPr lang="en-US"/>
           </a:p>
@@ -2173,7 +2182,8 @@
           <a:p>
             <a:fld id="{E7BB8C4D-0357-4062-A8F6-849BE8FF36EF}" type="datetime1">
               <a:rPr lang="en-US" smtClean="0"/>
-              <a:t>8/30/2018</a:t>
+              <a:pPr/>
+              <a:t>9/30/2018</a:t>
             </a:fld>
             <a:endParaRPr lang="en-US"/>
           </a:p>
@@ -2287,7 +2297,8 @@
           <a:p>
             <a:fld id="{51ACA8F1-CCC2-4CC7-BBA5-DF449191E161}" type="datetime1">
               <a:rPr lang="en-US" smtClean="0"/>
-              <a:t>8/30/2018</a:t>
+              <a:pPr/>
+              <a:t>9/30/2018</a:t>
             </a:fld>
             <a:endParaRPr lang="en-US"/>
           </a:p>
@@ -2378,7 +2389,8 @@
           <a:p>
             <a:fld id="{3145E5F7-97AA-4CBF-B201-25649592E731}" type="datetime1">
               <a:rPr lang="en-US" smtClean="0"/>
-              <a:t>8/30/2018</a:t>
+              <a:pPr/>
+              <a:t>9/30/2018</a:t>
             </a:fld>
             <a:endParaRPr lang="en-US"/>
           </a:p>
@@ -2651,7 +2663,8 @@
           <a:p>
             <a:fld id="{C5D97EC2-6FA1-4149-89C3-196C9ABF2EBA}" type="datetime1">
               <a:rPr lang="en-US" smtClean="0"/>
-              <a:t>8/30/2018</a:t>
+              <a:pPr/>
+              <a:t>9/30/2018</a:t>
             </a:fld>
             <a:endParaRPr lang="en-US"/>
           </a:p>
@@ -2900,7 +2913,8 @@
           <a:p>
             <a:fld id="{68A061C9-6ACD-4AE5-96E5-8F9FAF094229}" type="datetime1">
               <a:rPr lang="en-US" smtClean="0"/>
-              <a:t>8/30/2018</a:t>
+              <a:pPr/>
+              <a:t>9/30/2018</a:t>
             </a:fld>
             <a:endParaRPr lang="en-US"/>
           </a:p>
@@ -3109,7 +3123,8 @@
           <a:p>
             <a:fld id="{9BC60D8E-D44C-4D9A-B314-56D932C33CE1}" type="datetime1">
               <a:rPr lang="en-US" smtClean="0"/>
-              <a:t>8/30/2018</a:t>
+              <a:pPr/>
+              <a:t>9/30/2018</a:t>
             </a:fld>
             <a:endParaRPr lang="en-US"/>
           </a:p>
@@ -3592,6 +3607,63 @@
       </p:sp>
       <p:sp>
         <p:nvSpPr>
+          <p:cNvPr id="4" name="Title 3"/>
+          <p:cNvSpPr>
+            <a:spLocks noGrp="1"/>
+          </p:cNvSpPr>
+          <p:nvPr>
+            <p:ph type="title"/>
+          </p:nvPr>
+        </p:nvSpPr>
+        <p:spPr/>
+        <p:txBody>
+          <a:bodyPr/>
+          <a:lstStyle/>
+          <a:p>
+            <a:endParaRPr lang="en-US"/>
+          </a:p>
+        </p:txBody>
+      </p:sp>
+      <p:sp>
+        <p:nvSpPr>
+          <p:cNvPr id="5" name="Content Placeholder 4"/>
+          <p:cNvSpPr>
+            <a:spLocks noGrp="1"/>
+          </p:cNvSpPr>
+          <p:nvPr>
+            <p:ph sz="half" idx="1"/>
+          </p:nvPr>
+        </p:nvSpPr>
+        <p:spPr/>
+        <p:txBody>
+          <a:bodyPr/>
+          <a:lstStyle/>
+          <a:p>
+            <a:endParaRPr lang="en-US"/>
+          </a:p>
+        </p:txBody>
+      </p:sp>
+      <p:sp>
+        <p:nvSpPr>
+          <p:cNvPr id="6" name="Content Placeholder 5"/>
+          <p:cNvSpPr>
+            <a:spLocks noGrp="1"/>
+          </p:cNvSpPr>
+          <p:nvPr>
+            <p:ph sz="half" idx="2"/>
+          </p:nvPr>
+        </p:nvSpPr>
+        <p:spPr/>
+        <p:txBody>
+          <a:bodyPr/>
+          <a:lstStyle/>
+          <a:p>
+            <a:endParaRPr lang="en-US"/>
+          </a:p>
+        </p:txBody>
+      </p:sp>
+      <p:sp>
+        <p:nvSpPr>
           <p:cNvPr id="3" name="Slide Number Placeholder 2"/>
           <p:cNvSpPr>
             <a:spLocks noGrp="1"/>
@@ -3666,6 +3738,44 @@
               <a:t>Original slide #3</a:t>
             </a:r>
             <a:endParaRPr lang="en-US" dirty="0"/>
+          </a:p>
+        </p:txBody>
+      </p:sp>
+      <p:sp>
+        <p:nvSpPr>
+          <p:cNvPr id="4" name="Title 3"/>
+          <p:cNvSpPr>
+            <a:spLocks noGrp="1"/>
+          </p:cNvSpPr>
+          <p:nvPr>
+            <p:ph type="title"/>
+          </p:nvPr>
+        </p:nvSpPr>
+        <p:spPr/>
+        <p:txBody>
+          <a:bodyPr/>
+          <a:lstStyle/>
+          <a:p>
+            <a:endParaRPr lang="en-US"/>
+          </a:p>
+        </p:txBody>
+      </p:sp>
+      <p:sp>
+        <p:nvSpPr>
+          <p:cNvPr id="5" name="Content Placeholder 4"/>
+          <p:cNvSpPr>
+            <a:spLocks noGrp="1"/>
+          </p:cNvSpPr>
+          <p:nvPr>
+            <p:ph idx="1"/>
+          </p:nvPr>
+        </p:nvSpPr>
+        <p:spPr/>
+        <p:txBody>
+          <a:bodyPr/>
+          <a:lstStyle/>
+          <a:p>
+            <a:endParaRPr lang="en-US"/>
           </a:p>
         </p:txBody>
       </p:sp>

</xml_diff>